<commit_message>
adding correction to file
</commit_message>
<xml_diff>
--- a/Projects/mini-project-1/your-project/MASTERMIND_presentation.pptx
+++ b/Projects/mini-project-1/your-project/MASTERMIND_presentation.pptx
@@ -291,7 +291,7 @@
           <a:p>
             <a:fld id="{1CDAE3EE-A93A-41FD-B8F6-D68314E34F8F}" type="datetimeFigureOut">
               <a:rPr lang="fr-FR" smtClean="0"/>
-              <a:t>28/08/2020</a:t>
+              <a:t>31/08/2020</a:t>
             </a:fld>
             <a:endParaRPr lang="fr-FR"/>
           </a:p>
@@ -489,7 +489,7 @@
           <a:p>
             <a:fld id="{1CDAE3EE-A93A-41FD-B8F6-D68314E34F8F}" type="datetimeFigureOut">
               <a:rPr lang="fr-FR" smtClean="0"/>
-              <a:t>28/08/2020</a:t>
+              <a:t>31/08/2020</a:t>
             </a:fld>
             <a:endParaRPr lang="fr-FR"/>
           </a:p>
@@ -697,7 +697,7 @@
           <a:p>
             <a:fld id="{1CDAE3EE-A93A-41FD-B8F6-D68314E34F8F}" type="datetimeFigureOut">
               <a:rPr lang="fr-FR" smtClean="0"/>
-              <a:t>28/08/2020</a:t>
+              <a:t>31/08/2020</a:t>
             </a:fld>
             <a:endParaRPr lang="fr-FR"/>
           </a:p>
@@ -895,7 +895,7 @@
           <a:p>
             <a:fld id="{1CDAE3EE-A93A-41FD-B8F6-D68314E34F8F}" type="datetimeFigureOut">
               <a:rPr lang="fr-FR" smtClean="0"/>
-              <a:t>28/08/2020</a:t>
+              <a:t>31/08/2020</a:t>
             </a:fld>
             <a:endParaRPr lang="fr-FR"/>
           </a:p>
@@ -1170,7 +1170,7 @@
           <a:p>
             <a:fld id="{1CDAE3EE-A93A-41FD-B8F6-D68314E34F8F}" type="datetimeFigureOut">
               <a:rPr lang="fr-FR" smtClean="0"/>
-              <a:t>28/08/2020</a:t>
+              <a:t>31/08/2020</a:t>
             </a:fld>
             <a:endParaRPr lang="fr-FR"/>
           </a:p>
@@ -1435,7 +1435,7 @@
           <a:p>
             <a:fld id="{1CDAE3EE-A93A-41FD-B8F6-D68314E34F8F}" type="datetimeFigureOut">
               <a:rPr lang="fr-FR" smtClean="0"/>
-              <a:t>28/08/2020</a:t>
+              <a:t>31/08/2020</a:t>
             </a:fld>
             <a:endParaRPr lang="fr-FR"/>
           </a:p>
@@ -1847,7 +1847,7 @@
           <a:p>
             <a:fld id="{1CDAE3EE-A93A-41FD-B8F6-D68314E34F8F}" type="datetimeFigureOut">
               <a:rPr lang="fr-FR" smtClean="0"/>
-              <a:t>28/08/2020</a:t>
+              <a:t>31/08/2020</a:t>
             </a:fld>
             <a:endParaRPr lang="fr-FR"/>
           </a:p>
@@ -1988,7 +1988,7 @@
           <a:p>
             <a:fld id="{1CDAE3EE-A93A-41FD-B8F6-D68314E34F8F}" type="datetimeFigureOut">
               <a:rPr lang="fr-FR" smtClean="0"/>
-              <a:t>28/08/2020</a:t>
+              <a:t>31/08/2020</a:t>
             </a:fld>
             <a:endParaRPr lang="fr-FR"/>
           </a:p>
@@ -2101,7 +2101,7 @@
           <a:p>
             <a:fld id="{1CDAE3EE-A93A-41FD-B8F6-D68314E34F8F}" type="datetimeFigureOut">
               <a:rPr lang="fr-FR" smtClean="0"/>
-              <a:t>28/08/2020</a:t>
+              <a:t>31/08/2020</a:t>
             </a:fld>
             <a:endParaRPr lang="fr-FR"/>
           </a:p>
@@ -2412,7 +2412,7 @@
           <a:p>
             <a:fld id="{1CDAE3EE-A93A-41FD-B8F6-D68314E34F8F}" type="datetimeFigureOut">
               <a:rPr lang="fr-FR" smtClean="0"/>
-              <a:t>28/08/2020</a:t>
+              <a:t>31/08/2020</a:t>
             </a:fld>
             <a:endParaRPr lang="fr-FR"/>
           </a:p>
@@ -2700,7 +2700,7 @@
           <a:p>
             <a:fld id="{1CDAE3EE-A93A-41FD-B8F6-D68314E34F8F}" type="datetimeFigureOut">
               <a:rPr lang="fr-FR" smtClean="0"/>
-              <a:t>28/08/2020</a:t>
+              <a:t>31/08/2020</a:t>
             </a:fld>
             <a:endParaRPr lang="fr-FR"/>
           </a:p>
@@ -2941,7 +2941,7 @@
           <a:p>
             <a:fld id="{1CDAE3EE-A93A-41FD-B8F6-D68314E34F8F}" type="datetimeFigureOut">
               <a:rPr lang="fr-FR" smtClean="0"/>
-              <a:t>28/08/2020</a:t>
+              <a:t>31/08/2020</a:t>
             </a:fld>
             <a:endParaRPr lang="fr-FR"/>
           </a:p>
@@ -16213,8 +16213,8 @@
         </p:nvSpPr>
         <p:spPr>
           <a:xfrm>
-            <a:off x="620486" y="304800"/>
-            <a:ext cx="11081657" cy="6740307"/>
+            <a:off x="673495" y="638657"/>
+            <a:ext cx="11081657" cy="5262979"/>
           </a:xfrm>
           <a:prstGeom prst="rect">
             <a:avLst/>
@@ -16227,254 +16227,341 @@
           </a:bodyPr>
           <a:lstStyle/>
           <a:p>
-            <a:endParaRPr lang="fr-FR" sz="3200" b="1" dirty="0"/>
+            <a:pPr algn="just"/>
+            <a:r>
+              <a:rPr lang="fr-FR" sz="2800" b="1" dirty="0"/>
+              <a:t>If I </a:t>
+            </a:r>
+            <a:r>
+              <a:rPr lang="fr-FR" sz="2800" b="1" dirty="0" err="1"/>
+              <a:t>were</a:t>
+            </a:r>
+            <a:r>
+              <a:rPr lang="fr-FR" sz="2800" b="1" dirty="0"/>
+              <a:t> to start </a:t>
+            </a:r>
+            <a:r>
+              <a:rPr lang="fr-FR" sz="2800" b="1" dirty="0" err="1"/>
+              <a:t>from</a:t>
+            </a:r>
+            <a:r>
+              <a:rPr lang="fr-FR" sz="2800" b="1" dirty="0"/>
+              <a:t> scratch...</a:t>
+            </a:r>
           </a:p>
           <a:p>
             <a:pPr algn="just"/>
             <a:r>
-              <a:rPr lang="fr-FR" sz="3200" b="1" dirty="0"/>
-              <a:t>If I </a:t>
-            </a:r>
-            <a:r>
-              <a:rPr lang="fr-FR" sz="3200" b="1" dirty="0" err="1"/>
-              <a:t>were</a:t>
-            </a:r>
-            <a:r>
-              <a:rPr lang="fr-FR" sz="3200" b="1" dirty="0"/>
-              <a:t> to start </a:t>
-            </a:r>
-            <a:r>
-              <a:rPr lang="fr-FR" sz="3200" b="1" dirty="0" err="1"/>
-              <a:t>from</a:t>
-            </a:r>
-            <a:r>
-              <a:rPr lang="fr-FR" sz="3200" b="1" dirty="0"/>
-              <a:t> scratch...</a:t>
+              <a:rPr lang="fr-FR" sz="2800" dirty="0" err="1"/>
+              <a:t>we</a:t>
+            </a:r>
+            <a:r>
+              <a:rPr lang="fr-FR" sz="2800" dirty="0"/>
+              <a:t> </a:t>
+            </a:r>
+            <a:r>
+              <a:rPr lang="fr-FR" sz="2800" dirty="0" err="1"/>
+              <a:t>would</a:t>
+            </a:r>
+            <a:r>
+              <a:rPr lang="fr-FR" sz="2800" dirty="0"/>
+              <a:t> </a:t>
+            </a:r>
+            <a:r>
+              <a:rPr lang="fr-FR" sz="2800" dirty="0" err="1"/>
+              <a:t>never</a:t>
+            </a:r>
+            <a:r>
+              <a:rPr lang="fr-FR" sz="2800" dirty="0"/>
+              <a:t> have been able to finish </a:t>
+            </a:r>
+            <a:r>
+              <a:rPr lang="fr-FR" sz="2800" dirty="0" err="1"/>
+              <a:t>this</a:t>
+            </a:r>
+            <a:r>
+              <a:rPr lang="fr-FR" sz="2800" dirty="0"/>
+              <a:t> </a:t>
+            </a:r>
+            <a:r>
+              <a:rPr lang="fr-FR" sz="2800" dirty="0" err="1"/>
+              <a:t>project</a:t>
+            </a:r>
+            <a:r>
+              <a:rPr lang="fr-FR" sz="2800" dirty="0"/>
+              <a:t> on time.</a:t>
             </a:r>
           </a:p>
           <a:p>
             <a:pPr algn="just"/>
-            <a:r>
-              <a:rPr lang="fr-FR" sz="3200" dirty="0" err="1"/>
-              <a:t>we</a:t>
-            </a:r>
-            <a:r>
-              <a:rPr lang="fr-FR" sz="3200" dirty="0"/>
-              <a:t> </a:t>
-            </a:r>
-            <a:r>
-              <a:rPr lang="fr-FR" sz="3200" dirty="0" err="1"/>
-              <a:t>would</a:t>
-            </a:r>
-            <a:r>
-              <a:rPr lang="fr-FR" sz="3200" dirty="0"/>
-              <a:t> </a:t>
-            </a:r>
-            <a:r>
-              <a:rPr lang="fr-FR" sz="3200" dirty="0" err="1"/>
-              <a:t>never</a:t>
-            </a:r>
-            <a:r>
-              <a:rPr lang="fr-FR" sz="3200" dirty="0"/>
-              <a:t> have been able to finish </a:t>
-            </a:r>
-            <a:r>
-              <a:rPr lang="fr-FR" sz="3200" dirty="0" err="1"/>
-              <a:t>this</a:t>
-            </a:r>
-            <a:r>
-              <a:rPr lang="fr-FR" sz="3200" dirty="0"/>
-              <a:t> </a:t>
-            </a:r>
-            <a:r>
-              <a:rPr lang="fr-FR" sz="3200" dirty="0" err="1"/>
-              <a:t>project</a:t>
-            </a:r>
-            <a:r>
-              <a:rPr lang="fr-FR" sz="3200" dirty="0"/>
-              <a:t> on time.</a:t>
-            </a:r>
+            <a:endParaRPr lang="fr-FR" sz="2800" u="sng" dirty="0"/>
           </a:p>
           <a:p>
             <a:pPr algn="just"/>
-            <a:endParaRPr lang="fr-FR" sz="3200" u="sng" dirty="0"/>
+            <a:r>
+              <a:rPr lang="fr-FR" sz="2800" b="1" dirty="0" err="1"/>
+              <a:t>Improvements</a:t>
+            </a:r>
+            <a:r>
+              <a:rPr lang="fr-FR" sz="2800" b="1" dirty="0"/>
+              <a:t>:</a:t>
+            </a:r>
           </a:p>
           <a:p>
             <a:pPr algn="just"/>
             <a:r>
-              <a:rPr lang="fr-FR" sz="3200" b="1" dirty="0" err="1"/>
-              <a:t>Improvements</a:t>
-            </a:r>
-            <a:r>
-              <a:rPr lang="fr-FR" sz="3200" b="1" dirty="0"/>
-              <a:t>:</a:t>
+              <a:rPr lang="fr-FR" sz="2800" dirty="0" err="1"/>
+              <a:t>We</a:t>
+            </a:r>
+            <a:r>
+              <a:rPr lang="fr-FR" sz="2800" dirty="0"/>
+              <a:t> </a:t>
+            </a:r>
+            <a:r>
+              <a:rPr lang="fr-FR" sz="2800" dirty="0" err="1"/>
+              <a:t>could</a:t>
+            </a:r>
+            <a:r>
+              <a:rPr lang="fr-FR" sz="2800" dirty="0"/>
+              <a:t> have</a:t>
             </a:r>
           </a:p>
           <a:p>
             <a:pPr algn="just"/>
             <a:r>
-              <a:rPr lang="fr-FR" sz="3200" dirty="0" err="1"/>
-              <a:t>We</a:t>
-            </a:r>
-            <a:r>
-              <a:rPr lang="fr-FR" sz="3200" dirty="0"/>
+              <a:rPr lang="fr-FR" sz="2800" dirty="0"/>
+              <a:t>- split the </a:t>
+            </a:r>
+            <a:r>
+              <a:rPr lang="fr-FR" sz="2800" dirty="0" err="1"/>
+              <a:t>project</a:t>
+            </a:r>
+            <a:r>
+              <a:rPr lang="fr-FR" sz="2800" dirty="0"/>
               <a:t> </a:t>
             </a:r>
             <a:r>
-              <a:rPr lang="fr-FR" sz="3200" dirty="0" err="1"/>
-              <a:t>could</a:t>
-            </a:r>
-            <a:r>
-              <a:rPr lang="fr-FR" sz="3200" dirty="0"/>
-              <a:t> have split the </a:t>
-            </a:r>
-            <a:r>
-              <a:rPr lang="fr-FR" sz="3200" dirty="0" err="1"/>
-              <a:t>project</a:t>
-            </a:r>
-            <a:r>
-              <a:rPr lang="fr-FR" sz="3200" dirty="0"/>
-              <a:t> </a:t>
-            </a:r>
-            <a:r>
-              <a:rPr lang="fr-FR" sz="3200" dirty="0" err="1"/>
+              <a:rPr lang="fr-FR" sz="2800" dirty="0" err="1"/>
               <a:t>into</a:t>
             </a:r>
             <a:r>
-              <a:rPr lang="fr-FR" sz="3200" dirty="0"/>
+              <a:rPr lang="fr-FR" sz="2800" dirty="0"/>
               <a:t> more </a:t>
             </a:r>
             <a:r>
-              <a:rPr lang="fr-FR" sz="3200" dirty="0" err="1"/>
+              <a:rPr lang="fr-FR" sz="2800" dirty="0" err="1"/>
               <a:t>tasks</a:t>
             </a:r>
             <a:r>
-              <a:rPr lang="fr-FR" sz="3200" dirty="0"/>
+              <a:rPr lang="fr-FR" sz="2800" dirty="0"/>
               <a:t> on Trello in </a:t>
             </a:r>
             <a:r>
-              <a:rPr lang="fr-FR" sz="3200" dirty="0" err="1"/>
+              <a:rPr lang="fr-FR" sz="2800" dirty="0" err="1"/>
               <a:t>order</a:t>
             </a:r>
             <a:r>
-              <a:rPr lang="fr-FR" sz="3200" dirty="0"/>
+              <a:rPr lang="fr-FR" sz="2800" dirty="0"/>
               <a:t> to </a:t>
             </a:r>
             <a:r>
-              <a:rPr lang="fr-FR" sz="3200" dirty="0" err="1"/>
+              <a:rPr lang="fr-FR" sz="2800" dirty="0" err="1"/>
               <a:t>better</a:t>
             </a:r>
             <a:r>
-              <a:rPr lang="fr-FR" sz="3200" dirty="0"/>
+              <a:rPr lang="fr-FR" sz="2800" dirty="0"/>
               <a:t> balance </a:t>
             </a:r>
             <a:r>
-              <a:rPr lang="fr-FR" sz="3200" dirty="0" err="1"/>
+              <a:rPr lang="fr-FR" sz="2800" dirty="0" err="1"/>
               <a:t>them</a:t>
             </a:r>
             <a:r>
-              <a:rPr lang="fr-FR" sz="3200" dirty="0"/>
+              <a:rPr lang="fr-FR" sz="2800" dirty="0"/>
               <a:t>.</a:t>
             </a:r>
           </a:p>
           <a:p>
             <a:pPr algn="just"/>
             <a:r>
-              <a:rPr lang="fr-FR" sz="3200" dirty="0"/>
+              <a:rPr lang="fr-FR" sz="2800" dirty="0"/>
+              <a:t>- </a:t>
+            </a:r>
+            <a:r>
+              <a:rPr lang="fr-FR" sz="2800" dirty="0" err="1"/>
+              <a:t>improved</a:t>
+            </a:r>
+            <a:r>
+              <a:rPr lang="fr-FR" sz="2800" dirty="0"/>
               <a:t> </a:t>
+            </a:r>
+            <a:r>
+              <a:rPr lang="fr-FR" sz="2800" dirty="0" err="1"/>
+              <a:t>our</a:t>
+            </a:r>
+            <a:r>
+              <a:rPr lang="fr-FR" sz="2800" dirty="0"/>
+              <a:t> code, </a:t>
+            </a:r>
+            <a:r>
+              <a:rPr lang="fr-FR" sz="2800" dirty="0" err="1"/>
+              <a:t>which</a:t>
+            </a:r>
+            <a:r>
+              <a:rPr lang="fr-FR" sz="2800" dirty="0"/>
+              <a:t> </a:t>
+            </a:r>
+            <a:r>
+              <a:rPr lang="fr-FR" sz="2800" dirty="0" err="1"/>
+              <a:t>is</a:t>
+            </a:r>
+            <a:r>
+              <a:rPr lang="fr-FR" sz="2800" dirty="0"/>
+              <a:t> not </a:t>
+            </a:r>
+            <a:r>
+              <a:rPr lang="fr-FR" sz="2800" dirty="0" err="1"/>
+              <a:t>perfect</a:t>
+            </a:r>
+            <a:r>
+              <a:rPr lang="fr-FR" sz="2800" dirty="0"/>
+              <a:t>.</a:t>
             </a:r>
           </a:p>
           <a:p>
             <a:pPr algn="just"/>
             <a:r>
-              <a:rPr lang="fr-FR" sz="3200" b="1" dirty="0"/>
-              <a:t>Highlights:</a:t>
+              <a:rPr lang="fr-FR" sz="2800" dirty="0"/>
+              <a:t>- </a:t>
+            </a:r>
+            <a:r>
+              <a:rPr lang="fr-FR" sz="2800" dirty="0" err="1"/>
+              <a:t>used</a:t>
+            </a:r>
+            <a:r>
+              <a:rPr lang="fr-FR" sz="2800" dirty="0"/>
+              <a:t> Git as </a:t>
+            </a:r>
+            <a:r>
+              <a:rPr lang="fr-FR" sz="2800" dirty="0" err="1"/>
+              <a:t>it’s</a:t>
+            </a:r>
+            <a:r>
+              <a:rPr lang="fr-FR" sz="2800" dirty="0"/>
+              <a:t> made for : </a:t>
+            </a:r>
+            <a:r>
+              <a:rPr lang="fr-FR" sz="2800" dirty="0" err="1"/>
+              <a:t>with</a:t>
+            </a:r>
+            <a:r>
+              <a:rPr lang="fr-FR" sz="2800" dirty="0"/>
+              <a:t> </a:t>
+            </a:r>
+            <a:r>
+              <a:rPr lang="fr-FR" sz="2800" dirty="0" err="1"/>
+              <a:t>merging</a:t>
+            </a:r>
+            <a:r>
+              <a:rPr lang="fr-FR" sz="2800" dirty="0"/>
+              <a:t> branches…</a:t>
             </a:r>
           </a:p>
           <a:p>
             <a:pPr algn="just"/>
             <a:r>
-              <a:rPr lang="fr-FR" sz="3200" dirty="0"/>
-              <a:t>Our </a:t>
-            </a:r>
-            <a:r>
-              <a:rPr lang="fr-FR" sz="3200" dirty="0" err="1"/>
-              <a:t>mastermind</a:t>
-            </a:r>
-            <a:r>
-              <a:rPr lang="fr-FR" sz="3200" dirty="0"/>
+              <a:rPr lang="fr-FR" sz="2800" dirty="0"/>
               <a:t> </a:t>
-            </a:r>
-            <a:r>
-              <a:rPr lang="fr-FR" sz="3200" dirty="0" err="1"/>
-              <a:t>is</a:t>
-            </a:r>
-            <a:r>
-              <a:rPr lang="fr-FR" sz="3200" dirty="0"/>
-              <a:t> </a:t>
-            </a:r>
-            <a:r>
-              <a:rPr lang="fr-FR" sz="3200" dirty="0" err="1"/>
-              <a:t>playable</a:t>
-            </a:r>
-            <a:r>
-              <a:rPr lang="fr-FR" sz="3200" dirty="0"/>
-              <a:t> !</a:t>
             </a:r>
           </a:p>
           <a:p>
             <a:pPr algn="just"/>
             <a:r>
-              <a:rPr lang="fr-FR" sz="3200" dirty="0" err="1"/>
-              <a:t>We</a:t>
-            </a:r>
-            <a:r>
-              <a:rPr lang="fr-FR" sz="3200" dirty="0"/>
-              <a:t> </a:t>
-            </a:r>
-            <a:r>
-              <a:rPr lang="fr-FR" sz="3200" dirty="0" err="1"/>
-              <a:t>did</a:t>
-            </a:r>
-            <a:r>
-              <a:rPr lang="fr-FR" sz="3200" dirty="0"/>
-              <a:t> </a:t>
-            </a:r>
-            <a:r>
-              <a:rPr lang="fr-FR" sz="3200" dirty="0" err="1"/>
-              <a:t>it</a:t>
-            </a:r>
-            <a:r>
-              <a:rPr lang="fr-FR" sz="3200" dirty="0"/>
-              <a:t> </a:t>
-            </a:r>
-            <a:r>
-              <a:rPr lang="fr-FR" sz="3200" dirty="0" err="1"/>
-              <a:t>instead</a:t>
-            </a:r>
-            <a:r>
-              <a:rPr lang="fr-FR" sz="3200" dirty="0"/>
-              <a:t> of </a:t>
-            </a:r>
-            <a:r>
-              <a:rPr lang="fr-FR" sz="3200" dirty="0" err="1"/>
-              <a:t>remote</a:t>
-            </a:r>
-            <a:r>
-              <a:rPr lang="fr-FR" sz="3200" dirty="0"/>
-              <a:t> conditions, </a:t>
-            </a:r>
-            <a:r>
-              <a:rPr lang="fr-FR" sz="3200" dirty="0" err="1"/>
-              <a:t>thank</a:t>
-            </a:r>
-            <a:r>
-              <a:rPr lang="fr-FR" sz="3200" dirty="0"/>
-              <a:t> to a good communication.</a:t>
+              <a:rPr lang="fr-FR" sz="2800" b="1" dirty="0"/>
+              <a:t>Highlights:</a:t>
             </a:r>
           </a:p>
           <a:p>
-            <a:pPr algn="ctr"/>
+            <a:pPr algn="just"/>
+            <a:r>
+              <a:rPr lang="fr-FR" sz="2800" dirty="0"/>
+              <a:t>Our </a:t>
+            </a:r>
+            <a:r>
+              <a:rPr lang="fr-FR" sz="2800" dirty="0" err="1"/>
+              <a:t>mastermind</a:t>
+            </a:r>
+            <a:r>
+              <a:rPr lang="fr-FR" sz="2800" dirty="0"/>
+              <a:t> </a:t>
+            </a:r>
+            <a:r>
+              <a:rPr lang="fr-FR" sz="2800" dirty="0" err="1"/>
+              <a:t>is</a:t>
+            </a:r>
+            <a:r>
+              <a:rPr lang="fr-FR" sz="2800" dirty="0"/>
+              <a:t> </a:t>
+            </a:r>
+            <a:r>
+              <a:rPr lang="fr-FR" sz="2800" dirty="0" err="1"/>
+              <a:t>playable</a:t>
+            </a:r>
+            <a:r>
+              <a:rPr lang="fr-FR" sz="2800" dirty="0"/>
+              <a:t> !</a:t>
+            </a:r>
+          </a:p>
+          <a:p>
+            <a:pPr algn="just"/>
+            <a:r>
+              <a:rPr lang="fr-FR" sz="2800" dirty="0" err="1"/>
+              <a:t>We</a:t>
+            </a:r>
+            <a:r>
+              <a:rPr lang="fr-FR" sz="2800" dirty="0"/>
+              <a:t> </a:t>
+            </a:r>
+            <a:r>
+              <a:rPr lang="fr-FR" sz="2800" dirty="0" err="1"/>
+              <a:t>did</a:t>
+            </a:r>
+            <a:r>
+              <a:rPr lang="fr-FR" sz="2800" dirty="0"/>
+              <a:t> </a:t>
+            </a:r>
+            <a:r>
+              <a:rPr lang="fr-FR" sz="2800" dirty="0" err="1"/>
+              <a:t>it</a:t>
+            </a:r>
+            <a:r>
+              <a:rPr lang="fr-FR" sz="2800" dirty="0"/>
+              <a:t> </a:t>
+            </a:r>
+            <a:r>
+              <a:rPr lang="fr-FR" sz="2800" dirty="0" err="1"/>
+              <a:t>instead</a:t>
+            </a:r>
+            <a:r>
+              <a:rPr lang="fr-FR" sz="2800" dirty="0"/>
+              <a:t> of </a:t>
+            </a:r>
+            <a:r>
+              <a:rPr lang="fr-FR" sz="2800" dirty="0" err="1"/>
+              <a:t>remote</a:t>
+            </a:r>
+            <a:r>
+              <a:rPr lang="fr-FR" sz="2800" dirty="0"/>
+              <a:t> conditions, </a:t>
+            </a:r>
+            <a:r>
+              <a:rPr lang="fr-FR" sz="2800" dirty="0" err="1"/>
+              <a:t>thanks</a:t>
+            </a:r>
+            <a:r>
+              <a:rPr lang="fr-FR" sz="2800" dirty="0"/>
+              <a:t> to a good communication.</a:t>
+            </a:r>
             <a:endParaRPr lang="fr-FR" sz="4800" dirty="0"/>
           </a:p>
         </p:txBody>
@@ -19490,8 +19577,8 @@
         </p:nvSpPr>
         <p:spPr>
           <a:xfrm>
-            <a:off x="421703" y="2881721"/>
-            <a:ext cx="11081657" cy="830997"/>
+            <a:off x="225287" y="1718518"/>
+            <a:ext cx="4866979" cy="1569660"/>
           </a:xfrm>
           <a:prstGeom prst="rect">
             <a:avLst/>
@@ -19505,8 +19592,20 @@
           <a:lstStyle/>
           <a:p>
             <a:r>
+              <a:rPr lang="fr-FR" sz="4800" dirty="0" err="1"/>
+              <a:t>Specifications</a:t>
+            </a:r>
+            <a:r>
               <a:rPr lang="fr-FR" sz="4800" dirty="0"/>
-              <a:t>Our </a:t>
+              <a:t> of </a:t>
+            </a:r>
+            <a:r>
+              <a:rPr lang="fr-FR" sz="4800" dirty="0" err="1"/>
+              <a:t>our</a:t>
+            </a:r>
+            <a:r>
+              <a:rPr lang="fr-FR" sz="4800" dirty="0"/>
+              <a:t> </a:t>
             </a:r>
             <a:r>
               <a:rPr lang="fr-FR" sz="4800" dirty="0" err="1"/>
@@ -19514,7 +19613,7 @@
             </a:r>
             <a:r>
               <a:rPr lang="fr-FR" sz="4800" dirty="0"/>
-              <a:t> plan</a:t>
+              <a:t> code :</a:t>
             </a:r>
           </a:p>
         </p:txBody>

</xml_diff>